<commit_message>
ROC curve 그림 1, 2 작성
</commit_message>
<xml_diff>
--- a/pics/2020-08-05-ROC/pics.pptx
+++ b/pics/2020-08-05-ROC/pics.pptx
@@ -6,6 +6,7 @@
   </p:sldMasterIdLst>
   <p:sldIdLst>
     <p:sldId id="256" r:id="rId2"/>
+    <p:sldId id="257" r:id="rId3"/>
   </p:sldIdLst>
   <p:sldSz cx="12192000" cy="6858000"/>
   <p:notesSz cx="6858000" cy="9144000"/>
@@ -3321,6 +3322,236 @@
           <a:chExt cx="0" cy="0"/>
         </a:xfrm>
       </p:grpSpPr>
+      <p:pic>
+        <p:nvPicPr>
+          <p:cNvPr id="39" name="그림 38">
+            <a:extLst>
+              <a:ext uri="{FF2B5EF4-FFF2-40B4-BE49-F238E27FC236}">
+                <a16:creationId xmlns:a16="http://schemas.microsoft.com/office/drawing/2014/main" id="{30CD348D-CA05-4F90-BABD-5D1EC966DD96}"/>
+              </a:ext>
+            </a:extLst>
+          </p:cNvPr>
+          <p:cNvPicPr>
+            <a:picLocks noChangeAspect="1"/>
+          </p:cNvPicPr>
+          <p:nvPr/>
+        </p:nvPicPr>
+        <p:blipFill>
+          <a:blip r:embed="rId2"/>
+          <a:stretch>
+            <a:fillRect/>
+          </a:stretch>
+        </p:blipFill>
+        <p:spPr>
+          <a:xfrm>
+            <a:off x="1392814" y="314961"/>
+            <a:ext cx="9406372" cy="6085838"/>
+          </a:xfrm>
+          <a:prstGeom prst="rect">
+            <a:avLst/>
+          </a:prstGeom>
+        </p:spPr>
+      </p:pic>
+      <p:sp>
+        <p:nvSpPr>
+          <p:cNvPr id="40" name="화살표: 아래쪽 39">
+            <a:extLst>
+              <a:ext uri="{FF2B5EF4-FFF2-40B4-BE49-F238E27FC236}">
+                <a16:creationId xmlns:a16="http://schemas.microsoft.com/office/drawing/2014/main" id="{C636919F-70AE-4516-AD5E-5AF6D5513E9D}"/>
+              </a:ext>
+            </a:extLst>
+          </p:cNvPr>
+          <p:cNvSpPr/>
+          <p:nvPr/>
+        </p:nvSpPr>
+        <p:spPr>
+          <a:xfrm rot="8146898">
+            <a:off x="5012975" y="1526409"/>
+            <a:ext cx="866544" cy="1985957"/>
+          </a:xfrm>
+          <a:prstGeom prst="downArrow">
+            <a:avLst/>
+          </a:prstGeom>
+          <a:solidFill>
+            <a:schemeClr val="accent2">
+              <a:alpha val="54000"/>
+            </a:schemeClr>
+          </a:solidFill>
+          <a:ln>
+            <a:noFill/>
+          </a:ln>
+        </p:spPr>
+        <p:style>
+          <a:lnRef idx="2">
+            <a:schemeClr val="accent1">
+              <a:shade val="50000"/>
+            </a:schemeClr>
+          </a:lnRef>
+          <a:fillRef idx="1">
+            <a:schemeClr val="accent1"/>
+          </a:fillRef>
+          <a:effectRef idx="0">
+            <a:schemeClr val="accent1"/>
+          </a:effectRef>
+          <a:fontRef idx="minor">
+            <a:schemeClr val="lt1"/>
+          </a:fontRef>
+        </p:style>
+        <p:txBody>
+          <a:bodyPr rtlCol="0" anchor="ctr"/>
+          <a:lstStyle/>
+          <a:p>
+            <a:pPr algn="ctr"/>
+            <a:endParaRPr lang="ko-KR" altLang="en-US"/>
+          </a:p>
+        </p:txBody>
+      </p:sp>
+      <p:sp>
+        <p:nvSpPr>
+          <p:cNvPr id="41" name="TextBox 40">
+            <a:extLst>
+              <a:ext uri="{FF2B5EF4-FFF2-40B4-BE49-F238E27FC236}">
+                <a16:creationId xmlns:a16="http://schemas.microsoft.com/office/drawing/2014/main" id="{5AE765D6-3153-461F-8CE0-F860ABEF7768}"/>
+              </a:ext>
+            </a:extLst>
+          </p:cNvPr>
+          <p:cNvSpPr txBox="1"/>
+          <p:nvPr/>
+        </p:nvSpPr>
+        <p:spPr>
+          <a:xfrm>
+            <a:off x="6342832" y="3357880"/>
+            <a:ext cx="2137124" cy="1200329"/>
+          </a:xfrm>
+          <a:prstGeom prst="rect">
+            <a:avLst/>
+          </a:prstGeom>
+          <a:solidFill>
+            <a:schemeClr val="bg1"/>
+          </a:solidFill>
+          <a:ln>
+            <a:solidFill>
+              <a:schemeClr val="tx1"/>
+            </a:solidFill>
+          </a:ln>
+        </p:spPr>
+        <p:txBody>
+          <a:bodyPr wrap="none" rtlCol="0">
+            <a:spAutoFit/>
+          </a:bodyPr>
+          <a:lstStyle/>
+          <a:p>
+            <a:pPr algn="ctr"/>
+            <a:r>
+              <a:rPr lang="en-US" altLang="ko-KR" dirty="0">
+                <a:latin typeface="KoPub돋움체 Medium" panose="00000600000000000000" pitchFamily="2" charset="-127"/>
+                <a:ea typeface="KoPub돋움체 Medium" panose="00000600000000000000" pitchFamily="2" charset="-127"/>
+              </a:rPr>
+              <a:t>[</a:t>
+            </a:r>
+            <a:r>
+              <a:rPr lang="ko-KR" altLang="en-US" dirty="0">
+                <a:latin typeface="KoPub돋움체 Medium" panose="00000600000000000000" pitchFamily="2" charset="-127"/>
+                <a:ea typeface="KoPub돋움체 Medium" panose="00000600000000000000" pitchFamily="2" charset="-127"/>
+              </a:rPr>
+              <a:t>☆ 핵심 ☆</a:t>
+            </a:r>
+            <a:r>
+              <a:rPr lang="en-US" altLang="ko-KR" dirty="0">
+                <a:latin typeface="KoPub돋움체 Medium" panose="00000600000000000000" pitchFamily="2" charset="-127"/>
+                <a:ea typeface="KoPub돋움체 Medium" panose="00000600000000000000" pitchFamily="2" charset="-127"/>
+              </a:rPr>
+              <a:t>]</a:t>
+            </a:r>
+          </a:p>
+          <a:p>
+            <a:pPr algn="ctr"/>
+            <a:r>
+              <a:rPr lang="ko-KR" altLang="en-US" dirty="0">
+                <a:latin typeface="KoPub돋움체 Medium" panose="00000600000000000000" pitchFamily="2" charset="-127"/>
+                <a:ea typeface="KoPub돋움체 Medium" panose="00000600000000000000" pitchFamily="2" charset="-127"/>
+              </a:rPr>
+              <a:t>좌상단으로 붙어있는 </a:t>
+            </a:r>
+            <a:endParaRPr lang="en-US" altLang="ko-KR" dirty="0">
+              <a:latin typeface="KoPub돋움체 Medium" panose="00000600000000000000" pitchFamily="2" charset="-127"/>
+              <a:ea typeface="KoPub돋움체 Medium" panose="00000600000000000000" pitchFamily="2" charset="-127"/>
+            </a:endParaRPr>
+          </a:p>
+          <a:p>
+            <a:pPr algn="ctr"/>
+            <a:r>
+              <a:rPr lang="en-US" altLang="ko-KR" dirty="0">
+                <a:latin typeface="KoPub돋움체 Medium" panose="00000600000000000000" pitchFamily="2" charset="-127"/>
+                <a:ea typeface="KoPub돋움체 Medium" panose="00000600000000000000" pitchFamily="2" charset="-127"/>
+              </a:rPr>
+              <a:t>ROC </a:t>
+            </a:r>
+            <a:r>
+              <a:rPr lang="ko-KR" altLang="en-US" dirty="0">
+                <a:latin typeface="KoPub돋움체 Medium" panose="00000600000000000000" pitchFamily="2" charset="-127"/>
+                <a:ea typeface="KoPub돋움체 Medium" panose="00000600000000000000" pitchFamily="2" charset="-127"/>
+              </a:rPr>
+              <a:t>커브일 수록</a:t>
+            </a:r>
+            <a:endParaRPr lang="en-US" altLang="ko-KR" dirty="0">
+              <a:latin typeface="KoPub돋움체 Medium" panose="00000600000000000000" pitchFamily="2" charset="-127"/>
+              <a:ea typeface="KoPub돋움체 Medium" panose="00000600000000000000" pitchFamily="2" charset="-127"/>
+            </a:endParaRPr>
+          </a:p>
+          <a:p>
+            <a:pPr algn="ctr"/>
+            <a:r>
+              <a:rPr lang="ko-KR" altLang="en-US" dirty="0">
+                <a:latin typeface="KoPub돋움체 Medium" panose="00000600000000000000" pitchFamily="2" charset="-127"/>
+                <a:ea typeface="KoPub돋움체 Medium" panose="00000600000000000000" pitchFamily="2" charset="-127"/>
+              </a:rPr>
+              <a:t>더 좋은 이진분류기</a:t>
+            </a:r>
+            <a:r>
+              <a:rPr lang="en-US" altLang="ko-KR" dirty="0">
+                <a:latin typeface="KoPub돋움체 Medium" panose="00000600000000000000" pitchFamily="2" charset="-127"/>
+                <a:ea typeface="KoPub돋움체 Medium" panose="00000600000000000000" pitchFamily="2" charset="-127"/>
+              </a:rPr>
+              <a:t>!</a:t>
+            </a:r>
+            <a:endParaRPr lang="ko-KR" altLang="en-US" dirty="0">
+              <a:latin typeface="KoPub돋움체 Medium" panose="00000600000000000000" pitchFamily="2" charset="-127"/>
+              <a:ea typeface="KoPub돋움체 Medium" panose="00000600000000000000" pitchFamily="2" charset="-127"/>
+            </a:endParaRPr>
+          </a:p>
+        </p:txBody>
+      </p:sp>
+    </p:spTree>
+    <p:extLst>
+      <p:ext uri="{BB962C8B-B14F-4D97-AF65-F5344CB8AC3E}">
+        <p14:creationId xmlns:p14="http://schemas.microsoft.com/office/powerpoint/2010/main" val="2900096345"/>
+      </p:ext>
+    </p:extLst>
+  </p:cSld>
+  <p:clrMapOvr>
+    <a:masterClrMapping/>
+  </p:clrMapOvr>
+</p:sld>
+</file>
+
+<file path=ppt/slides/slide2.xml><?xml version="1.0" encoding="utf-8"?>
+<p:sld xmlns:a="http://schemas.openxmlformats.org/drawingml/2006/main" xmlns:r="http://schemas.openxmlformats.org/officeDocument/2006/relationships" xmlns:p="http://schemas.openxmlformats.org/presentationml/2006/main">
+  <p:cSld>
+    <p:spTree>
+      <p:nvGrpSpPr>
+        <p:cNvPr id="1" name=""/>
+        <p:cNvGrpSpPr/>
+        <p:nvPr/>
+      </p:nvGrpSpPr>
+      <p:grpSpPr>
+        <a:xfrm>
+          <a:off x="0" y="0"/>
+          <a:ext cx="0" cy="0"/>
+          <a:chOff x="0" y="0"/>
+          <a:chExt cx="0" cy="0"/>
+        </a:xfrm>
+      </p:grpSpPr>
       <p:sp>
         <p:nvSpPr>
           <p:cNvPr id="30" name="원호 29">
@@ -4224,7 +4455,7 @@
     </p:spTree>
     <p:extLst>
       <p:ext uri="{BB962C8B-B14F-4D97-AF65-F5344CB8AC3E}">
-        <p14:creationId xmlns:p14="http://schemas.microsoft.com/office/powerpoint/2010/main" val="2900096345"/>
+        <p14:creationId xmlns:p14="http://schemas.microsoft.com/office/powerpoint/2010/main" val="3889586777"/>
       </p:ext>
     </p:extLst>
   </p:cSld>

</xml_diff>

<commit_message>
ROC curve youtube video embedding과 pic2 오류 수정
</commit_message>
<xml_diff>
--- a/pics/2020-08-05-ROC/pics.pptx
+++ b/pics/2020-08-05-ROC/pics.pptx
@@ -260,7 +260,7 @@
           <a:p>
             <a:fld id="{4867D6D7-C105-4BD2-AF78-853AE09D28DB}" type="datetimeFigureOut">
               <a:rPr lang="ko-KR" altLang="en-US" smtClean="0"/>
-              <a:t>2020-08-16</a:t>
+              <a:t>2020-08-22</a:t>
             </a:fld>
             <a:endParaRPr lang="ko-KR" altLang="en-US"/>
           </a:p>
@@ -458,7 +458,7 @@
           <a:p>
             <a:fld id="{4867D6D7-C105-4BD2-AF78-853AE09D28DB}" type="datetimeFigureOut">
               <a:rPr lang="ko-KR" altLang="en-US" smtClean="0"/>
-              <a:t>2020-08-16</a:t>
+              <a:t>2020-08-22</a:t>
             </a:fld>
             <a:endParaRPr lang="ko-KR" altLang="en-US"/>
           </a:p>
@@ -666,7 +666,7 @@
           <a:p>
             <a:fld id="{4867D6D7-C105-4BD2-AF78-853AE09D28DB}" type="datetimeFigureOut">
               <a:rPr lang="ko-KR" altLang="en-US" smtClean="0"/>
-              <a:t>2020-08-16</a:t>
+              <a:t>2020-08-22</a:t>
             </a:fld>
             <a:endParaRPr lang="ko-KR" altLang="en-US"/>
           </a:p>
@@ -864,7 +864,7 @@
           <a:p>
             <a:fld id="{4867D6D7-C105-4BD2-AF78-853AE09D28DB}" type="datetimeFigureOut">
               <a:rPr lang="ko-KR" altLang="en-US" smtClean="0"/>
-              <a:t>2020-08-16</a:t>
+              <a:t>2020-08-22</a:t>
             </a:fld>
             <a:endParaRPr lang="ko-KR" altLang="en-US"/>
           </a:p>
@@ -1139,7 +1139,7 @@
           <a:p>
             <a:fld id="{4867D6D7-C105-4BD2-AF78-853AE09D28DB}" type="datetimeFigureOut">
               <a:rPr lang="ko-KR" altLang="en-US" smtClean="0"/>
-              <a:t>2020-08-16</a:t>
+              <a:t>2020-08-22</a:t>
             </a:fld>
             <a:endParaRPr lang="ko-KR" altLang="en-US"/>
           </a:p>
@@ -1404,7 +1404,7 @@
           <a:p>
             <a:fld id="{4867D6D7-C105-4BD2-AF78-853AE09D28DB}" type="datetimeFigureOut">
               <a:rPr lang="ko-KR" altLang="en-US" smtClean="0"/>
-              <a:t>2020-08-16</a:t>
+              <a:t>2020-08-22</a:t>
             </a:fld>
             <a:endParaRPr lang="ko-KR" altLang="en-US"/>
           </a:p>
@@ -1816,7 +1816,7 @@
           <a:p>
             <a:fld id="{4867D6D7-C105-4BD2-AF78-853AE09D28DB}" type="datetimeFigureOut">
               <a:rPr lang="ko-KR" altLang="en-US" smtClean="0"/>
-              <a:t>2020-08-16</a:t>
+              <a:t>2020-08-22</a:t>
             </a:fld>
             <a:endParaRPr lang="ko-KR" altLang="en-US"/>
           </a:p>
@@ -1957,7 +1957,7 @@
           <a:p>
             <a:fld id="{4867D6D7-C105-4BD2-AF78-853AE09D28DB}" type="datetimeFigureOut">
               <a:rPr lang="ko-KR" altLang="en-US" smtClean="0"/>
-              <a:t>2020-08-16</a:t>
+              <a:t>2020-08-22</a:t>
             </a:fld>
             <a:endParaRPr lang="ko-KR" altLang="en-US"/>
           </a:p>
@@ -2070,7 +2070,7 @@
           <a:p>
             <a:fld id="{4867D6D7-C105-4BD2-AF78-853AE09D28DB}" type="datetimeFigureOut">
               <a:rPr lang="ko-KR" altLang="en-US" smtClean="0"/>
-              <a:t>2020-08-16</a:t>
+              <a:t>2020-08-22</a:t>
             </a:fld>
             <a:endParaRPr lang="ko-KR" altLang="en-US"/>
           </a:p>
@@ -2381,7 +2381,7 @@
           <a:p>
             <a:fld id="{4867D6D7-C105-4BD2-AF78-853AE09D28DB}" type="datetimeFigureOut">
               <a:rPr lang="ko-KR" altLang="en-US" smtClean="0"/>
-              <a:t>2020-08-16</a:t>
+              <a:t>2020-08-22</a:t>
             </a:fld>
             <a:endParaRPr lang="ko-KR" altLang="en-US"/>
           </a:p>
@@ -2669,7 +2669,7 @@
           <a:p>
             <a:fld id="{4867D6D7-C105-4BD2-AF78-853AE09D28DB}" type="datetimeFigureOut">
               <a:rPr lang="ko-KR" altLang="en-US" smtClean="0"/>
-              <a:t>2020-08-16</a:t>
+              <a:t>2020-08-22</a:t>
             </a:fld>
             <a:endParaRPr lang="ko-KR" altLang="en-US"/>
           </a:p>
@@ -2910,7 +2910,7 @@
           <a:p>
             <a:fld id="{4867D6D7-C105-4BD2-AF78-853AE09D28DB}" type="datetimeFigureOut">
               <a:rPr lang="ko-KR" altLang="en-US" smtClean="0"/>
-              <a:t>2020-08-16</a:t>
+              <a:t>2020-08-22</a:t>
             </a:fld>
             <a:endParaRPr lang="ko-KR" altLang="en-US"/>
           </a:p>
@@ -4287,7 +4287,7 @@
           <a:p>
             <a:r>
               <a:rPr lang="ko-KR" altLang="en-US" sz="2800" b="1" dirty="0"/>
-              <a:t>②</a:t>
+              <a:t>③</a:t>
             </a:r>
           </a:p>
         </p:txBody>
@@ -4322,7 +4322,7 @@
           <a:p>
             <a:r>
               <a:rPr lang="ko-KR" altLang="en-US" sz="2800" b="1" dirty="0"/>
-              <a:t>③</a:t>
+              <a:t>②</a:t>
             </a:r>
           </a:p>
         </p:txBody>

</xml_diff>